<commit_message>
small changes to lecture 18
</commit_message>
<xml_diff>
--- a/classes/prog2019/Prog3-Lecture18.pptx
+++ b/classes/prog2019/Prog3-Lecture18.pptx
@@ -142,10 +142,6 @@
 </p:presentation>
 </file>
 
-<file path=ppt/revisionInfo.xml><?xml version="1.0" encoding="utf-8"?>
-<p1510:revInfo xmlns:a="http://schemas.openxmlformats.org/drawingml/2006/main" xmlns:r="http://schemas.openxmlformats.org/officeDocument/2006/relationships" xmlns:p1510="http://schemas.microsoft.com/office/powerpoint/2015/10/main"/>
-</file>
-
 <file path=ppt/notesMasters/notesMaster1.xml><?xml version="1.0" encoding="utf-8"?>
 <p:notesMaster xmlns:a="http://schemas.openxmlformats.org/drawingml/2006/main" xmlns:r="http://schemas.openxmlformats.org/officeDocument/2006/relationships" xmlns:p="http://schemas.openxmlformats.org/presentationml/2006/main">
   <p:cSld>
@@ -228,7 +224,7 @@
           <a:p>
             <a:fld id="{827FF0C2-5BD7-4ACE-A692-9F9EF4AE1B37}" type="datetimeFigureOut">
               <a:rPr lang="en-US" smtClean="0"/>
-              <a:t>11/26/2018</a:t>
+              <a:t>11/14/2019</a:t>
             </a:fld>
             <a:endParaRPr lang="en-US"/>
           </a:p>
@@ -1059,7 +1055,7 @@
           <a:p>
             <a:fld id="{BD7867F7-6ED0-4676-9C58-D45A04AA3FAF}" type="datetimeFigureOut">
               <a:rPr lang="en-US" smtClean="0"/>
-              <a:t>11/26/2018</a:t>
+              <a:t>11/14/2019</a:t>
             </a:fld>
             <a:endParaRPr lang="en-US"/>
           </a:p>
@@ -1227,7 +1223,7 @@
           <a:p>
             <a:fld id="{BD7867F7-6ED0-4676-9C58-D45A04AA3FAF}" type="datetimeFigureOut">
               <a:rPr lang="en-US" smtClean="0"/>
-              <a:t>11/26/2018</a:t>
+              <a:t>11/14/2019</a:t>
             </a:fld>
             <a:endParaRPr lang="en-US"/>
           </a:p>
@@ -1405,7 +1401,7 @@
           <a:p>
             <a:fld id="{BD7867F7-6ED0-4676-9C58-D45A04AA3FAF}" type="datetimeFigureOut">
               <a:rPr lang="en-US" smtClean="0"/>
-              <a:t>11/26/2018</a:t>
+              <a:t>11/14/2019</a:t>
             </a:fld>
             <a:endParaRPr lang="en-US"/>
           </a:p>
@@ -1573,7 +1569,7 @@
           <a:p>
             <a:fld id="{BD7867F7-6ED0-4676-9C58-D45A04AA3FAF}" type="datetimeFigureOut">
               <a:rPr lang="en-US" smtClean="0"/>
-              <a:t>11/26/2018</a:t>
+              <a:t>11/14/2019</a:t>
             </a:fld>
             <a:endParaRPr lang="en-US"/>
           </a:p>
@@ -1818,7 +1814,7 @@
           <a:p>
             <a:fld id="{BD7867F7-6ED0-4676-9C58-D45A04AA3FAF}" type="datetimeFigureOut">
               <a:rPr lang="en-US" smtClean="0"/>
-              <a:t>11/26/2018</a:t>
+              <a:t>11/14/2019</a:t>
             </a:fld>
             <a:endParaRPr lang="en-US"/>
           </a:p>
@@ -2047,7 +2043,7 @@
           <a:p>
             <a:fld id="{BD7867F7-6ED0-4676-9C58-D45A04AA3FAF}" type="datetimeFigureOut">
               <a:rPr lang="en-US" smtClean="0"/>
-              <a:t>11/26/2018</a:t>
+              <a:t>11/14/2019</a:t>
             </a:fld>
             <a:endParaRPr lang="en-US"/>
           </a:p>
@@ -2411,7 +2407,7 @@
           <a:p>
             <a:fld id="{BD7867F7-6ED0-4676-9C58-D45A04AA3FAF}" type="datetimeFigureOut">
               <a:rPr lang="en-US" smtClean="0"/>
-              <a:t>11/26/2018</a:t>
+              <a:t>11/14/2019</a:t>
             </a:fld>
             <a:endParaRPr lang="en-US"/>
           </a:p>
@@ -2528,7 +2524,7 @@
           <a:p>
             <a:fld id="{BD7867F7-6ED0-4676-9C58-D45A04AA3FAF}" type="datetimeFigureOut">
               <a:rPr lang="en-US" smtClean="0"/>
-              <a:t>11/26/2018</a:t>
+              <a:t>11/14/2019</a:t>
             </a:fld>
             <a:endParaRPr lang="en-US"/>
           </a:p>
@@ -2623,7 +2619,7 @@
           <a:p>
             <a:fld id="{BD7867F7-6ED0-4676-9C58-D45A04AA3FAF}" type="datetimeFigureOut">
               <a:rPr lang="en-US" smtClean="0"/>
-              <a:t>11/26/2018</a:t>
+              <a:t>11/14/2019</a:t>
             </a:fld>
             <a:endParaRPr lang="en-US"/>
           </a:p>
@@ -2898,7 +2894,7 @@
           <a:p>
             <a:fld id="{BD7867F7-6ED0-4676-9C58-D45A04AA3FAF}" type="datetimeFigureOut">
               <a:rPr lang="en-US" smtClean="0"/>
-              <a:t>11/26/2018</a:t>
+              <a:t>11/14/2019</a:t>
             </a:fld>
             <a:endParaRPr lang="en-US"/>
           </a:p>
@@ -3150,7 +3146,7 @@
           <a:p>
             <a:fld id="{BD7867F7-6ED0-4676-9C58-D45A04AA3FAF}" type="datetimeFigureOut">
               <a:rPr lang="en-US" smtClean="0"/>
-              <a:t>11/26/2018</a:t>
+              <a:t>11/14/2019</a:t>
             </a:fld>
             <a:endParaRPr lang="en-US"/>
           </a:p>
@@ -3361,7 +3357,7 @@
           <a:p>
             <a:fld id="{BD7867F7-6ED0-4676-9C58-D45A04AA3FAF}" type="datetimeFigureOut">
               <a:rPr lang="en-US" smtClean="0"/>
-              <a:t>11/26/2018</a:t>
+              <a:t>11/14/2019</a:t>
             </a:fld>
             <a:endParaRPr lang="en-US"/>
           </a:p>
@@ -3870,13 +3866,6 @@
   <p:clrMapOvr>
     <a:masterClrMapping/>
   </p:clrMapOvr>
-  <p:timing>
-    <p:tnLst>
-      <p:par>
-        <p:cTn id="1" dur="indefinite" restart="never" nodeType="tmRoot"/>
-      </p:par>
-    </p:tnLst>
-  </p:timing>
 </p:sld>
 </file>
 
@@ -4019,13 +4008,6 @@
   <p:clrMapOvr>
     <a:masterClrMapping/>
   </p:clrMapOvr>
-  <p:timing>
-    <p:tnLst>
-      <p:par>
-        <p:cTn id="1" dur="indefinite" restart="never" nodeType="tmRoot"/>
-      </p:par>
-    </p:tnLst>
-  </p:timing>
 </p:sld>
 </file>
 
@@ -4112,13 +4094,6 @@
   <p:clrMapOvr>
     <a:masterClrMapping/>
   </p:clrMapOvr>
-  <p:timing>
-    <p:tnLst>
-      <p:par>
-        <p:cTn id="1" dur="indefinite" restart="never" nodeType="tmRoot"/>
-      </p:par>
-    </p:tnLst>
-  </p:timing>
 </p:sld>
 </file>
 
@@ -4244,13 +4219,6 @@
   <p:clrMapOvr>
     <a:masterClrMapping/>
   </p:clrMapOvr>
-  <p:timing>
-    <p:tnLst>
-      <p:par>
-        <p:cTn id="1" dur="indefinite" restart="never" nodeType="tmRoot"/>
-      </p:par>
-    </p:tnLst>
-  </p:timing>
 </p:sld>
 </file>
 
@@ -4453,7 +4421,7 @@
         <p:spPr>
           <a:xfrm>
             <a:off x="5070764" y="2956958"/>
-            <a:ext cx="2894062" cy="369332"/>
+            <a:ext cx="5856090" cy="369332"/>
           </a:xfrm>
           <a:prstGeom prst="rect">
             <a:avLst/>
@@ -4476,7 +4444,7 @@
             </a:r>
             <a:r>
               <a:rPr lang="en-US" dirty="0"/>
-              <a:t>() to bucket id</a:t>
+              <a:t>() of the data to put into the map to bucket id</a:t>
             </a:r>
           </a:p>
         </p:txBody>
@@ -4523,7 +4491,7 @@
         <p:spPr>
           <a:xfrm>
             <a:off x="5460674" y="3881258"/>
-            <a:ext cx="2416367" cy="369332"/>
+            <a:ext cx="2403543" cy="369332"/>
           </a:xfrm>
           <a:prstGeom prst="rect">
             <a:avLst/>
@@ -4546,13 +4514,8 @@
             </a:r>
             <a:r>
               <a:rPr lang="en-US" dirty="0"/>
-              <a:t> to </a:t>
-            </a:r>
-            <a:r>
-              <a:rPr lang="en-US" dirty="0" err="1"/>
-              <a:t>mapID</a:t>
-            </a:r>
-            <a:endParaRPr lang="en-US" dirty="0"/>
+              <a:t> to lock id</a:t>
+            </a:r>
           </a:p>
         </p:txBody>
       </p:sp>
@@ -4565,7 +4528,7 @@
         <p:spPr>
           <a:xfrm>
             <a:off x="6222670" y="783771"/>
-            <a:ext cx="5627566" cy="1200329"/>
+            <a:ext cx="5030095" cy="1200329"/>
           </a:xfrm>
           <a:prstGeom prst="rect">
             <a:avLst/>
@@ -4607,7 +4570,7 @@
             </a:r>
             <a:r>
               <a:rPr lang="en-US" dirty="0"/>
-              <a:t> % NUM_BUCKETS yields the lock for each bucket</a:t>
+              <a:t> % N_LOCKS yields the lock for each bucket</a:t>
             </a:r>
           </a:p>
         </p:txBody>
@@ -4622,13 +4585,6 @@
   <p:clrMapOvr>
     <a:masterClrMapping/>
   </p:clrMapOvr>
-  <p:timing>
-    <p:tnLst>
-      <p:par>
-        <p:cTn id="1" dur="indefinite" restart="never" nodeType="tmRoot"/>
-      </p:par>
-    </p:tnLst>
-  </p:timing>
 </p:sld>
 </file>
 
@@ -4826,13 +4782,6 @@
   <p:clrMapOvr>
     <a:masterClrMapping/>
   </p:clrMapOvr>
-  <p:timing>
-    <p:tnLst>
-      <p:par>
-        <p:cTn id="1" dur="indefinite" restart="never" nodeType="tmRoot"/>
-      </p:par>
-    </p:tnLst>
-  </p:timing>
 </p:sld>
 </file>
 
@@ -4957,13 +4906,6 @@
   <p:clrMapOvr>
     <a:masterClrMapping/>
   </p:clrMapOvr>
-  <p:timing>
-    <p:tnLst>
-      <p:par>
-        <p:cTn id="1" dur="indefinite" restart="never" nodeType="tmRoot"/>
-      </p:par>
-    </p:tnLst>
-  </p:timing>
 </p:sld>
 </file>
 
@@ -5125,13 +5067,6 @@
   <p:clrMapOvr>
     <a:masterClrMapping/>
   </p:clrMapOvr>
-  <p:timing>
-    <p:tnLst>
-      <p:par>
-        <p:cTn id="1" dur="indefinite" restart="never" nodeType="tmRoot"/>
-      </p:par>
-    </p:tnLst>
-  </p:timing>
 </p:sld>
 </file>
 
@@ -5188,7 +5123,7 @@
                 <a:latin typeface="Arial" panose="020B0604020202020204" pitchFamily="34" charset="0"/>
                 <a:cs typeface="Arial" panose="020B0604020202020204" pitchFamily="34" charset="0"/>
               </a:rPr>
-              <a:t>without explicit synchronization)</a:t>
+              <a:t>at a low level without explicit synchronization from the Java layer)</a:t>
             </a:r>
           </a:p>
         </p:txBody>
@@ -5217,6 +5152,101 @@
           </a:prstGeom>
         </p:spPr>
       </p:pic>
+      <p:cxnSp>
+        <p:nvCxnSpPr>
+          <p:cNvPr id="7" name="Straight Arrow Connector 6">
+            <a:extLst>
+              <a:ext uri="{FF2B5EF4-FFF2-40B4-BE49-F238E27FC236}">
+                <a16:creationId xmlns:a16="http://schemas.microsoft.com/office/drawing/2014/main" id="{3D5368D7-114E-41E4-A07D-0DC2ED9D7A26}"/>
+              </a:ext>
+            </a:extLst>
+          </p:cNvPr>
+          <p:cNvCxnSpPr/>
+          <p:nvPr/>
+        </p:nvCxnSpPr>
+        <p:spPr>
+          <a:xfrm flipH="1">
+            <a:off x="8336071" y="2398734"/>
+            <a:ext cx="845507" cy="0"/>
+          </a:xfrm>
+          <a:prstGeom prst="straightConnector1">
+            <a:avLst/>
+          </a:prstGeom>
+          <a:ln>
+            <a:tailEnd type="triangle"/>
+          </a:ln>
+        </p:spPr>
+        <p:style>
+          <a:lnRef idx="1">
+            <a:schemeClr val="accent1"/>
+          </a:lnRef>
+          <a:fillRef idx="0">
+            <a:schemeClr val="accent1"/>
+          </a:fillRef>
+          <a:effectRef idx="0">
+            <a:schemeClr val="accent1"/>
+          </a:effectRef>
+          <a:fontRef idx="minor">
+            <a:schemeClr val="tx1"/>
+          </a:fontRef>
+        </p:style>
+      </p:cxnSp>
+      <p:sp>
+        <p:nvSpPr>
+          <p:cNvPr id="8" name="TextBox 7">
+            <a:extLst>
+              <a:ext uri="{FF2B5EF4-FFF2-40B4-BE49-F238E27FC236}">
+                <a16:creationId xmlns:a16="http://schemas.microsoft.com/office/drawing/2014/main" id="{DB9CB75D-F11B-4105-997C-034AE715CBEE}"/>
+              </a:ext>
+            </a:extLst>
+          </p:cNvPr>
+          <p:cNvSpPr txBox="1"/>
+          <p:nvPr/>
+        </p:nvSpPr>
+        <p:spPr>
+          <a:xfrm>
+            <a:off x="9150264" y="2104373"/>
+            <a:ext cx="2698175" cy="923330"/>
+          </a:xfrm>
+          <a:prstGeom prst="rect">
+            <a:avLst/>
+          </a:prstGeom>
+          <a:noFill/>
+        </p:spPr>
+        <p:txBody>
+          <a:bodyPr wrap="none" rtlCol="0">
+            <a:spAutoFit/>
+          </a:bodyPr>
+          <a:lstStyle/>
+          <a:p>
+            <a:r>
+              <a:rPr lang="en-US" dirty="0">
+                <a:latin typeface="Arial" panose="020B0604020202020204" pitchFamily="34" charset="0"/>
+                <a:cs typeface="Arial" panose="020B0604020202020204" pitchFamily="34" charset="0"/>
+              </a:rPr>
+              <a:t>We only write the new</a:t>
+            </a:r>
+          </a:p>
+          <a:p>
+            <a:r>
+              <a:rPr lang="en-US" dirty="0">
+                <a:latin typeface="Arial" panose="020B0604020202020204" pitchFamily="34" charset="0"/>
+                <a:cs typeface="Arial" panose="020B0604020202020204" pitchFamily="34" charset="0"/>
+              </a:rPr>
+              <a:t>value if the current value</a:t>
+            </a:r>
+          </a:p>
+          <a:p>
+            <a:r>
+              <a:rPr lang="en-US" dirty="0">
+                <a:latin typeface="Arial" panose="020B0604020202020204" pitchFamily="34" charset="0"/>
+                <a:cs typeface="Arial" panose="020B0604020202020204" pitchFamily="34" charset="0"/>
+              </a:rPr>
+              <a:t>is the expected value</a:t>
+            </a:r>
+          </a:p>
+        </p:txBody>
+      </p:sp>
     </p:spTree>
     <p:extLst>
       <p:ext uri="{BB962C8B-B14F-4D97-AF65-F5344CB8AC3E}">
@@ -5227,13 +5257,6 @@
   <p:clrMapOvr>
     <a:masterClrMapping/>
   </p:clrMapOvr>
-  <p:timing>
-    <p:tnLst>
-      <p:par>
-        <p:cTn id="1" dur="indefinite" restart="never" nodeType="tmRoot"/>
-      </p:par>
-    </p:tnLst>
-  </p:timing>
 </p:sld>
 </file>
 
@@ -5305,21 +5328,7 @@
                 <a:latin typeface="Arial" panose="020B0604020202020204" pitchFamily="34" charset="0"/>
                 <a:cs typeface="Arial" panose="020B0604020202020204" pitchFamily="34" charset="0"/>
               </a:rPr>
-              <a:t>Here is a simulated atomic </a:t>
-            </a:r>
-            <a:r>
-              <a:rPr lang="en-US" dirty="0" err="1">
-                <a:latin typeface="Arial" panose="020B0604020202020204" pitchFamily="34" charset="0"/>
-                <a:cs typeface="Arial" panose="020B0604020202020204" pitchFamily="34" charset="0"/>
-              </a:rPr>
-              <a:t>incrementer</a:t>
-            </a:r>
-            <a:r>
-              <a:rPr lang="en-US" dirty="0">
-                <a:latin typeface="Arial" panose="020B0604020202020204" pitchFamily="34" charset="0"/>
-                <a:cs typeface="Arial" panose="020B0604020202020204" pitchFamily="34" charset="0"/>
-              </a:rPr>
-              <a:t> (like </a:t>
+              <a:t>Here is a simulated atomic incrementor (like </a:t>
             </a:r>
             <a:r>
               <a:rPr lang="en-US" dirty="0" err="1">
@@ -5394,13 +5403,6 @@
   <p:clrMapOvr>
     <a:masterClrMapping/>
   </p:clrMapOvr>
-  <p:timing>
-    <p:tnLst>
-      <p:par>
-        <p:cTn id="1" dur="indefinite" restart="never" nodeType="tmRoot"/>
-      </p:par>
-    </p:tnLst>
-  </p:timing>
 </p:sld>
 </file>
 
@@ -5493,14 +5495,14 @@
       </p:sp>
       <p:cxnSp>
         <p:nvCxnSpPr>
-          <p:cNvPr id="7" name="Straight Arrow Connector 6"/>
+          <p:cNvPr id="10" name="Straight Arrow Connector 9"/>
           <p:cNvCxnSpPr/>
           <p:nvPr/>
         </p:nvCxnSpPr>
         <p:spPr>
-          <a:xfrm flipH="1">
-            <a:off x="5961413" y="4393870"/>
-            <a:ext cx="961901" cy="213756"/>
+          <a:xfrm flipH="1" flipV="1">
+            <a:off x="5260769" y="5510151"/>
+            <a:ext cx="1365662" cy="510639"/>
           </a:xfrm>
           <a:prstGeom prst="straightConnector1">
             <a:avLst/>
@@ -5526,80 +5528,6 @@
       </p:cxnSp>
       <p:sp>
         <p:nvSpPr>
-          <p:cNvPr id="8" name="TextBox 7"/>
-          <p:cNvSpPr txBox="1"/>
-          <p:nvPr/>
-        </p:nvSpPr>
-        <p:spPr>
-          <a:xfrm>
-            <a:off x="7053945" y="4085113"/>
-            <a:ext cx="4172937" cy="646331"/>
-          </a:xfrm>
-          <a:prstGeom prst="rect">
-            <a:avLst/>
-          </a:prstGeom>
-          <a:noFill/>
-        </p:spPr>
-        <p:txBody>
-          <a:bodyPr wrap="none" rtlCol="0">
-            <a:spAutoFit/>
-          </a:bodyPr>
-          <a:lstStyle/>
-          <a:p>
-            <a:r>
-              <a:rPr lang="en-US" dirty="0">
-                <a:latin typeface="Arial" panose="020B0604020202020204" pitchFamily="34" charset="0"/>
-                <a:cs typeface="Arial" panose="020B0604020202020204" pitchFamily="34" charset="0"/>
-              </a:rPr>
-              <a:t>Have to be careful can’t be out of order</a:t>
-            </a:r>
-          </a:p>
-          <a:p>
-            <a:r>
-              <a:rPr lang="en-US" dirty="0">
-                <a:latin typeface="Arial" panose="020B0604020202020204" pitchFamily="34" charset="0"/>
-                <a:cs typeface="Arial" panose="020B0604020202020204" pitchFamily="34" charset="0"/>
-              </a:rPr>
-              <a:t>in either the old or the new…</a:t>
-            </a:r>
-          </a:p>
-        </p:txBody>
-      </p:sp>
-      <p:cxnSp>
-        <p:nvCxnSpPr>
-          <p:cNvPr id="10" name="Straight Arrow Connector 9"/>
-          <p:cNvCxnSpPr/>
-          <p:nvPr/>
-        </p:nvCxnSpPr>
-        <p:spPr>
-          <a:xfrm flipH="1" flipV="1">
-            <a:off x="5260769" y="5510151"/>
-            <a:ext cx="1365662" cy="510639"/>
-          </a:xfrm>
-          <a:prstGeom prst="straightConnector1">
-            <a:avLst/>
-          </a:prstGeom>
-          <a:ln>
-            <a:tailEnd type="triangle"/>
-          </a:ln>
-        </p:spPr>
-        <p:style>
-          <a:lnRef idx="1">
-            <a:schemeClr val="accent1"/>
-          </a:lnRef>
-          <a:fillRef idx="0">
-            <a:schemeClr val="accent1"/>
-          </a:fillRef>
-          <a:effectRef idx="0">
-            <a:schemeClr val="accent1"/>
-          </a:effectRef>
-          <a:fontRef idx="minor">
-            <a:schemeClr val="tx1"/>
-          </a:fontRef>
-        </p:style>
-      </p:cxnSp>
-      <p:sp>
-        <p:nvSpPr>
           <p:cNvPr id="11" name="TextBox 10"/>
           <p:cNvSpPr txBox="1"/>
           <p:nvPr/>
@@ -5645,13 +5573,6 @@
   <p:clrMapOvr>
     <a:masterClrMapping/>
   </p:clrMapOvr>
-  <p:timing>
-    <p:tnLst>
-      <p:par>
-        <p:cTn id="1" dur="indefinite" restart="never" nodeType="tmRoot"/>
-      </p:par>
-    </p:tnLst>
-  </p:timing>
 </p:sld>
 </file>
 
@@ -5738,13 +5659,6 @@
   <p:clrMapOvr>
     <a:masterClrMapping/>
   </p:clrMapOvr>
-  <p:timing>
-    <p:tnLst>
-      <p:par>
-        <p:cTn id="1" dur="indefinite" restart="never" nodeType="tmRoot"/>
-      </p:par>
-    </p:tnLst>
-  </p:timing>
 </p:sld>
 </file>
 
@@ -5979,13 +5893,6 @@
   <p:clrMapOvr>
     <a:masterClrMapping/>
   </p:clrMapOvr>
-  <p:timing>
-    <p:tnLst>
-      <p:par>
-        <p:cTn id="1" dur="indefinite" restart="never" nodeType="tmRoot"/>
-      </p:par>
-    </p:tnLst>
-  </p:timing>
 </p:sld>
 </file>
 
@@ -6105,13 +6012,6 @@
   <p:clrMapOvr>
     <a:masterClrMapping/>
   </p:clrMapOvr>
-  <p:timing>
-    <p:tnLst>
-      <p:par>
-        <p:cTn id="1" dur="indefinite" restart="never" nodeType="tmRoot"/>
-      </p:par>
-    </p:tnLst>
-  </p:timing>
 </p:sld>
 </file>
 
@@ -6258,13 +6158,6 @@
   <p:clrMapOvr>
     <a:masterClrMapping/>
   </p:clrMapOvr>
-  <p:timing>
-    <p:tnLst>
-      <p:par>
-        <p:cTn id="1" dur="indefinite" restart="never" nodeType="tmRoot"/>
-      </p:par>
-    </p:tnLst>
-  </p:timing>
 </p:sld>
 </file>
 
@@ -6548,13 +6441,6 @@
   <p:clrMapOvr>
     <a:masterClrMapping/>
   </p:clrMapOvr>
-  <p:timing>
-    <p:tnLst>
-      <p:par>
-        <p:cTn id="1" dur="indefinite" restart="never" nodeType="tmRoot"/>
-      </p:par>
-    </p:tnLst>
-  </p:timing>
 </p:sld>
 </file>
 
@@ -6649,13 +6535,6 @@
   <p:clrMapOvr>
     <a:masterClrMapping/>
   </p:clrMapOvr>
-  <p:timing>
-    <p:tnLst>
-      <p:par>
-        <p:cTn id="1" dur="indefinite" restart="never" nodeType="tmRoot"/>
-      </p:par>
-    </p:tnLst>
-  </p:timing>
 </p:sld>
 </file>
 
@@ -6699,12 +6578,8 @@
           <a:lstStyle/>
           <a:p>
             <a:r>
-              <a:rPr lang="en-US" dirty="0" smtClean="0"/>
-              <a:t>When </a:t>
-            </a:r>
-            <a:r>
               <a:rPr lang="en-US" dirty="0"/>
-              <a:t>the threads interfere with each other, they spin…</a:t>
+              <a:t>When the threads interfere with each other, they spin…</a:t>
             </a:r>
           </a:p>
           <a:p>
@@ -6786,13 +6661,6 @@
   <p:clrMapOvr>
     <a:masterClrMapping/>
   </p:clrMapOvr>
-  <p:timing>
-    <p:tnLst>
-      <p:par>
-        <p:cTn id="1" dur="indefinite" restart="never" nodeType="tmRoot"/>
-      </p:par>
-    </p:tnLst>
-  </p:timing>
 </p:sld>
 </file>
 
@@ -6898,13 +6766,6 @@
   <p:clrMapOvr>
     <a:masterClrMapping/>
   </p:clrMapOvr>
-  <p:timing>
-    <p:tnLst>
-      <p:par>
-        <p:cTn id="1" dur="indefinite" restart="never" nodeType="tmRoot"/>
-      </p:par>
-    </p:tnLst>
-  </p:timing>
 </p:sld>
 </file>
 
@@ -7029,13 +6890,6 @@
   <p:clrMapOvr>
     <a:masterClrMapping/>
   </p:clrMapOvr>
-  <p:timing>
-    <p:tnLst>
-      <p:par>
-        <p:cTn id="1" dur="indefinite" restart="never" nodeType="tmRoot"/>
-      </p:par>
-    </p:tnLst>
-  </p:timing>
 </p:sld>
 </file>
 
@@ -7122,13 +6976,6 @@
   <p:clrMapOvr>
     <a:masterClrMapping/>
   </p:clrMapOvr>
-  <p:timing>
-    <p:tnLst>
-      <p:par>
-        <p:cTn id="1" dur="indefinite" restart="never" nodeType="tmRoot"/>
-      </p:par>
-    </p:tnLst>
-  </p:timing>
 </p:sld>
 </file>
 
@@ -7290,13 +7137,6 @@
   <p:clrMapOvr>
     <a:masterClrMapping/>
   </p:clrMapOvr>
-  <p:timing>
-    <p:tnLst>
-      <p:par>
-        <p:cTn id="1" dur="indefinite" restart="never" nodeType="tmRoot"/>
-      </p:par>
-    </p:tnLst>
-  </p:timing>
 </p:sld>
 </file>
 
@@ -7407,13 +7247,6 @@
   <p:clrMapOvr>
     <a:masterClrMapping/>
   </p:clrMapOvr>
-  <p:timing>
-    <p:tnLst>
-      <p:par>
-        <p:cTn id="1" dur="indefinite" restart="never" nodeType="tmRoot"/>
-      </p:par>
-    </p:tnLst>
-  </p:timing>
 </p:sld>
 </file>
 
@@ -7737,13 +7570,6 @@
   <p:clrMapOvr>
     <a:masterClrMapping/>
   </p:clrMapOvr>
-  <p:timing>
-    <p:tnLst>
-      <p:par>
-        <p:cTn id="1" dur="indefinite" restart="never" nodeType="tmRoot"/>
-      </p:par>
-    </p:tnLst>
-  </p:timing>
 </p:sld>
 </file>
 
@@ -7854,13 +7680,6 @@
   <p:clrMapOvr>
     <a:masterClrMapping/>
   </p:clrMapOvr>
-  <p:timing>
-    <p:tnLst>
-      <p:par>
-        <p:cTn id="1" dur="indefinite" restart="never" nodeType="tmRoot"/>
-      </p:par>
-    </p:tnLst>
-  </p:timing>
 </p:sld>
 </file>
 
@@ -7997,13 +7816,6 @@
   <p:clrMapOvr>
     <a:masterClrMapping/>
   </p:clrMapOvr>
-  <p:timing>
-    <p:tnLst>
-      <p:par>
-        <p:cTn id="1" dur="indefinite" restart="never" nodeType="tmRoot"/>
-      </p:par>
-    </p:tnLst>
-  </p:timing>
 </p:sld>
 </file>
 
@@ -8128,13 +7940,6 @@
   <p:clrMapOvr>
     <a:masterClrMapping/>
   </p:clrMapOvr>
-  <p:timing>
-    <p:tnLst>
-      <p:par>
-        <p:cTn id="1" dur="indefinite" restart="never" nodeType="tmRoot"/>
-      </p:par>
-    </p:tnLst>
-  </p:timing>
 </p:sld>
 </file>
 
@@ -8293,13 +8098,6 @@
   <p:clrMapOvr>
     <a:masterClrMapping/>
   </p:clrMapOvr>
-  <p:timing>
-    <p:tnLst>
-      <p:par>
-        <p:cTn id="1" dur="indefinite" restart="never" nodeType="tmRoot"/>
-      </p:par>
-    </p:tnLst>
-  </p:timing>
 </p:sld>
 </file>
 

</xml_diff>